<commit_message>
Feature: crawler to skip some inexisting tiles
    Crawlers run into a lot of 404 response when a crawl zone is
    not filled up with valid image tiles, during which a lot of
    time is also wasted.
    By caching existence of ancestors of tiles to be accessed
    on the fly, many inexist tiles will be skipped and no internet
    request will be sent, considerable script excution time will
    be saved.
</commit_message>
<xml_diff>
--- a/sketchbook.pptx
+++ b/sketchbook.pptx
@@ -7,6 +7,7 @@
   <p:sldIdLst>
     <p:sldId id="256" r:id="rId2"/>
     <p:sldId id="257" r:id="rId3"/>
+    <p:sldId id="258" r:id="rId4"/>
   </p:sldIdLst>
   <p:sldSz cx="12192000" cy="6858000"/>
   <p:notesSz cx="6858000" cy="9144000"/>
@@ -105,19 +106,183 @@
       </a:defRPr>
     </a:lvl9pPr>
   </p:defaultTextStyle>
+  <p:extLst>
+    <p:ext uri="{EFAFB233-063F-42B5-8137-9DF3F51BA10A}">
+      <p15:sldGuideLst xmlns:p15="http://schemas.microsoft.com/office/powerpoint/2012/main"/>
+    </p:ext>
+  </p:extLst>
 </p:presentation>
 </file>
 
 <file path=ppt/revisionInfo.xml><?xml version="1.0" encoding="utf-8"?>
 <p1510:revInfo xmlns:a="http://schemas.openxmlformats.org/drawingml/2006/main" xmlns:r="http://schemas.openxmlformats.org/officeDocument/2006/relationships" xmlns:p1510="http://schemas.microsoft.com/office/powerpoint/2015/10/main">
   <p1510:revLst>
-    <p1510:client id="{D0110907-1906-4BB6-BD34-1C5A3B08B8CF}" v="59" dt="2020-11-30T21:39:32.582"/>
+    <p1510:client id="{63A4A104-CA01-4F8F-BA30-E276A7F7CD5E}" v="6" dt="2021-08-22T08:24:23.639"/>
   </p1510:revLst>
 </p1510:revInfo>
 </file>
 
 <file path=ppt/changesInfos/changesInfo1.xml><?xml version="1.0" encoding="utf-8"?>
 <pc:chgInfo xmlns:a="http://schemas.openxmlformats.org/drawingml/2006/main" xmlns:r="http://schemas.openxmlformats.org/officeDocument/2006/relationships" xmlns:ac="http://schemas.microsoft.com/office/drawing/2013/main/command" xmlns:pc="http://schemas.microsoft.com/office/powerpoint/2013/main/command">
+  <pc:docChgLst>
+    <pc:chgData name="唐 震宇" userId="afab4f9738b8280b" providerId="LiveId" clId="{63A4A104-CA01-4F8F-BA30-E276A7F7CD5E}"/>
+    <pc:docChg chg="undo custSel addSld delSld modSld sldOrd">
+      <pc:chgData name="唐 震宇" userId="afab4f9738b8280b" providerId="LiveId" clId="{63A4A104-CA01-4F8F-BA30-E276A7F7CD5E}" dt="2021-08-22T08:25:02.120" v="351" actId="20577"/>
+      <pc:docMkLst>
+        <pc:docMk/>
+      </pc:docMkLst>
+      <pc:sldChg chg="addSp delSp modSp add mod">
+        <pc:chgData name="唐 震宇" userId="afab4f9738b8280b" providerId="LiveId" clId="{63A4A104-CA01-4F8F-BA30-E276A7F7CD5E}" dt="2021-08-22T08:25:02.120" v="351" actId="20577"/>
+        <pc:sldMkLst>
+          <pc:docMk/>
+          <pc:sldMk cId="1823947985" sldId="258"/>
+        </pc:sldMkLst>
+        <pc:spChg chg="add mod">
+          <ac:chgData name="唐 震宇" userId="afab4f9738b8280b" providerId="LiveId" clId="{63A4A104-CA01-4F8F-BA30-E276A7F7CD5E}" dt="2021-08-22T06:56:05.318" v="291" actId="1076"/>
+          <ac:spMkLst>
+            <pc:docMk/>
+            <pc:sldMk cId="1823947985" sldId="258"/>
+            <ac:spMk id="2" creationId="{D883025B-9371-4B64-9765-92E491A39D13}"/>
+          </ac:spMkLst>
+        </pc:spChg>
+        <pc:spChg chg="add mod">
+          <ac:chgData name="唐 震宇" userId="afab4f9738b8280b" providerId="LiveId" clId="{63A4A104-CA01-4F8F-BA30-E276A7F7CD5E}" dt="2021-08-22T08:24:45.043" v="344" actId="1076"/>
+          <ac:spMkLst>
+            <pc:docMk/>
+            <pc:sldMk cId="1823947985" sldId="258"/>
+            <ac:spMk id="10" creationId="{34C9DBF4-CD33-443C-8AB1-45C2B5571234}"/>
+          </ac:spMkLst>
+        </pc:spChg>
+        <pc:spChg chg="add del mod">
+          <ac:chgData name="唐 震宇" userId="afab4f9738b8280b" providerId="LiveId" clId="{63A4A104-CA01-4F8F-BA30-E276A7F7CD5E}" dt="2021-08-22T08:24:22.992" v="339"/>
+          <ac:spMkLst>
+            <pc:docMk/>
+            <pc:sldMk cId="1823947985" sldId="258"/>
+            <ac:spMk id="20" creationId="{33E25B87-2DBD-481D-A0CF-FA70DF659413}"/>
+          </ac:spMkLst>
+        </pc:spChg>
+        <pc:spChg chg="add del mod">
+          <ac:chgData name="唐 震宇" userId="afab4f9738b8280b" providerId="LiveId" clId="{63A4A104-CA01-4F8F-BA30-E276A7F7CD5E}" dt="2021-08-22T08:24:22.992" v="339"/>
+          <ac:spMkLst>
+            <pc:docMk/>
+            <pc:sldMk cId="1823947985" sldId="258"/>
+            <ac:spMk id="21" creationId="{1DF60B64-BF63-4BCF-9611-7BC644D99A7B}"/>
+          </ac:spMkLst>
+        </pc:spChg>
+        <pc:spChg chg="add del mod">
+          <ac:chgData name="唐 震宇" userId="afab4f9738b8280b" providerId="LiveId" clId="{63A4A104-CA01-4F8F-BA30-E276A7F7CD5E}" dt="2021-08-22T06:55:47.371" v="288" actId="1076"/>
+          <ac:spMkLst>
+            <pc:docMk/>
+            <pc:sldMk cId="1823947985" sldId="258"/>
+            <ac:spMk id="22" creationId="{70490AE0-7CDE-4824-AF4B-F3F9D0B096F3}"/>
+          </ac:spMkLst>
+        </pc:spChg>
+        <pc:spChg chg="mod">
+          <ac:chgData name="唐 震宇" userId="afab4f9738b8280b" providerId="LiveId" clId="{63A4A104-CA01-4F8F-BA30-E276A7F7CD5E}" dt="2021-08-22T07:04:39.135" v="333" actId="14100"/>
+          <ac:spMkLst>
+            <pc:docMk/>
+            <pc:sldMk cId="1823947985" sldId="258"/>
+            <ac:spMk id="24" creationId="{761C6EB7-603B-400A-82CB-0E36A3F2CA41}"/>
+          </ac:spMkLst>
+        </pc:spChg>
+        <pc:spChg chg="add mod">
+          <ac:chgData name="唐 震宇" userId="afab4f9738b8280b" providerId="LiveId" clId="{63A4A104-CA01-4F8F-BA30-E276A7F7CD5E}" dt="2021-08-22T08:24:58.311" v="349" actId="1076"/>
+          <ac:spMkLst>
+            <pc:docMk/>
+            <pc:sldMk cId="1823947985" sldId="258"/>
+            <ac:spMk id="27" creationId="{440F10CB-0959-4909-80CC-0DDF59C412BB}"/>
+          </ac:spMkLst>
+        </pc:spChg>
+        <pc:spChg chg="add mod">
+          <ac:chgData name="唐 震宇" userId="afab4f9738b8280b" providerId="LiveId" clId="{63A4A104-CA01-4F8F-BA30-E276A7F7CD5E}" dt="2021-08-22T08:25:02.120" v="351" actId="20577"/>
+          <ac:spMkLst>
+            <pc:docMk/>
+            <pc:sldMk cId="1823947985" sldId="258"/>
+            <ac:spMk id="28" creationId="{95A76AD0-A301-44F4-80AD-69F5D8DE2212}"/>
+          </ac:spMkLst>
+        </pc:spChg>
+        <pc:graphicFrameChg chg="add mod modGraphic">
+          <ac:chgData name="唐 震宇" userId="afab4f9738b8280b" providerId="LiveId" clId="{63A4A104-CA01-4F8F-BA30-E276A7F7CD5E}" dt="2021-08-22T08:24:45.043" v="344" actId="1076"/>
+          <ac:graphicFrameMkLst>
+            <pc:docMk/>
+            <pc:sldMk cId="1823947985" sldId="258"/>
+            <ac:graphicFrameMk id="9" creationId="{5956A54D-DF5A-4556-B954-27232FA7A398}"/>
+          </ac:graphicFrameMkLst>
+        </pc:graphicFrameChg>
+        <pc:picChg chg="add del mod">
+          <ac:chgData name="唐 震宇" userId="afab4f9738b8280b" providerId="LiveId" clId="{63A4A104-CA01-4F8F-BA30-E276A7F7CD5E}" dt="2021-08-22T08:24:53.950" v="348" actId="1076"/>
+          <ac:picMkLst>
+            <pc:docMk/>
+            <pc:sldMk cId="1823947985" sldId="258"/>
+            <ac:picMk id="25" creationId="{07A8D77F-6312-4946-9D97-B805D1CAAEAB}"/>
+          </ac:picMkLst>
+        </pc:picChg>
+        <pc:cxnChg chg="add del mod">
+          <ac:chgData name="唐 震宇" userId="afab4f9738b8280b" providerId="LiveId" clId="{63A4A104-CA01-4F8F-BA30-E276A7F7CD5E}" dt="2021-08-22T07:04:39.135" v="333" actId="14100"/>
+          <ac:cxnSpMkLst>
+            <pc:docMk/>
+            <pc:sldMk cId="1823947985" sldId="258"/>
+            <ac:cxnSpMk id="8" creationId="{8C9F7433-D5EB-4EDD-BA2C-34633A487206}"/>
+          </ac:cxnSpMkLst>
+        </pc:cxnChg>
+        <pc:cxnChg chg="add del mod">
+          <ac:chgData name="唐 震宇" userId="afab4f9738b8280b" providerId="LiveId" clId="{63A4A104-CA01-4F8F-BA30-E276A7F7CD5E}" dt="2021-08-22T08:24:22.992" v="339"/>
+          <ac:cxnSpMkLst>
+            <pc:docMk/>
+            <pc:sldMk cId="1823947985" sldId="258"/>
+            <ac:cxnSpMk id="17" creationId="{10E1268A-5AE1-4411-B1B4-1A7CC0F3C1A1}"/>
+          </ac:cxnSpMkLst>
+        </pc:cxnChg>
+        <pc:cxnChg chg="add del mod">
+          <ac:chgData name="唐 震宇" userId="afab4f9738b8280b" providerId="LiveId" clId="{63A4A104-CA01-4F8F-BA30-E276A7F7CD5E}" dt="2021-08-22T07:04:39.135" v="333" actId="14100"/>
+          <ac:cxnSpMkLst>
+            <pc:docMk/>
+            <pc:sldMk cId="1823947985" sldId="258"/>
+            <ac:cxnSpMk id="18" creationId="{28C3C07A-B4DF-4AC8-9EBA-1688EA317900}"/>
+          </ac:cxnSpMkLst>
+        </pc:cxnChg>
+        <pc:cxnChg chg="add del mod">
+          <ac:chgData name="唐 震宇" userId="afab4f9738b8280b" providerId="LiveId" clId="{63A4A104-CA01-4F8F-BA30-E276A7F7CD5E}" dt="2021-08-22T08:24:22.992" v="339"/>
+          <ac:cxnSpMkLst>
+            <pc:docMk/>
+            <pc:sldMk cId="1823947985" sldId="258"/>
+            <ac:cxnSpMk id="19" creationId="{B5F432F0-C777-43A5-8537-310723480BA9}"/>
+          </ac:cxnSpMkLst>
+        </pc:cxnChg>
+        <pc:cxnChg chg="add mod">
+          <ac:chgData name="唐 震宇" userId="afab4f9738b8280b" providerId="LiveId" clId="{63A4A104-CA01-4F8F-BA30-E276A7F7CD5E}" dt="2021-08-22T08:24:29.823" v="341" actId="1076"/>
+          <ac:cxnSpMkLst>
+            <pc:docMk/>
+            <pc:sldMk cId="1823947985" sldId="258"/>
+            <ac:cxnSpMk id="23" creationId="{4F4C5BA0-6D85-4667-A5DF-86287FEEB2D6}"/>
+          </ac:cxnSpMkLst>
+        </pc:cxnChg>
+        <pc:cxnChg chg="add mod">
+          <ac:chgData name="唐 震宇" userId="afab4f9738b8280b" providerId="LiveId" clId="{63A4A104-CA01-4F8F-BA30-E276A7F7CD5E}" dt="2021-08-22T08:24:29.823" v="341" actId="1076"/>
+          <ac:cxnSpMkLst>
+            <pc:docMk/>
+            <pc:sldMk cId="1823947985" sldId="258"/>
+            <ac:cxnSpMk id="26" creationId="{0A5A9637-66B5-4DB9-81F2-17DC41F8BE79}"/>
+          </ac:cxnSpMkLst>
+        </pc:cxnChg>
+      </pc:sldChg>
+      <pc:sldChg chg="modSp add del mod ord">
+        <pc:chgData name="唐 震宇" userId="afab4f9738b8280b" providerId="LiveId" clId="{63A4A104-CA01-4F8F-BA30-E276A7F7CD5E}" dt="2021-08-22T06:49:07.266" v="5" actId="47"/>
+        <pc:sldMkLst>
+          <pc:docMk/>
+          <pc:sldMk cId="2672215293" sldId="258"/>
+        </pc:sldMkLst>
+        <pc:graphicFrameChg chg="mod">
+          <ac:chgData name="唐 震宇" userId="afab4f9738b8280b" providerId="LiveId" clId="{63A4A104-CA01-4F8F-BA30-E276A7F7CD5E}" dt="2021-08-22T06:49:05.409" v="4" actId="1076"/>
+          <ac:graphicFrameMkLst>
+            <pc:docMk/>
+            <pc:sldMk cId="2672215293" sldId="258"/>
+            <ac:graphicFrameMk id="5" creationId="{EAC6CE38-15AC-4AA7-991E-321F174E3AB0}"/>
+          </ac:graphicFrameMkLst>
+        </pc:graphicFrameChg>
+      </pc:sldChg>
+    </pc:docChg>
+  </pc:docChgLst>
   <pc:docChgLst>
     <pc:chgData name="唐 震宇" userId="afab4f9738b8280b" providerId="LiveId" clId="{D0110907-1906-4BB6-BD34-1C5A3B08B8CF}"/>
     <pc:docChg chg="undo redo custSel mod addSld modSld">
@@ -459,7 +624,7 @@
           <a:p>
             <a:fld id="{C8BC19B1-CC01-44C6-B518-3FF6E7FE4FAA}" type="datetimeFigureOut">
               <a:rPr lang="zh-CN" altLang="en-US" smtClean="0"/>
-              <a:t>2020-11-30</a:t>
+              <a:t>2021-08-22</a:t>
             </a:fld>
             <a:endParaRPr lang="zh-CN" altLang="en-US"/>
           </a:p>
@@ -657,7 +822,7 @@
           <a:p>
             <a:fld id="{C8BC19B1-CC01-44C6-B518-3FF6E7FE4FAA}" type="datetimeFigureOut">
               <a:rPr lang="zh-CN" altLang="en-US" smtClean="0"/>
-              <a:t>2020-11-30</a:t>
+              <a:t>2021-08-22</a:t>
             </a:fld>
             <a:endParaRPr lang="zh-CN" altLang="en-US"/>
           </a:p>
@@ -865,7 +1030,7 @@
           <a:p>
             <a:fld id="{C8BC19B1-CC01-44C6-B518-3FF6E7FE4FAA}" type="datetimeFigureOut">
               <a:rPr lang="zh-CN" altLang="en-US" smtClean="0"/>
-              <a:t>2020-11-30</a:t>
+              <a:t>2021-08-22</a:t>
             </a:fld>
             <a:endParaRPr lang="zh-CN" altLang="en-US"/>
           </a:p>
@@ -1063,7 +1228,7 @@
           <a:p>
             <a:fld id="{C8BC19B1-CC01-44C6-B518-3FF6E7FE4FAA}" type="datetimeFigureOut">
               <a:rPr lang="zh-CN" altLang="en-US" smtClean="0"/>
-              <a:t>2020-11-30</a:t>
+              <a:t>2021-08-22</a:t>
             </a:fld>
             <a:endParaRPr lang="zh-CN" altLang="en-US"/>
           </a:p>
@@ -1338,7 +1503,7 @@
           <a:p>
             <a:fld id="{C8BC19B1-CC01-44C6-B518-3FF6E7FE4FAA}" type="datetimeFigureOut">
               <a:rPr lang="zh-CN" altLang="en-US" smtClean="0"/>
-              <a:t>2020-11-30</a:t>
+              <a:t>2021-08-22</a:t>
             </a:fld>
             <a:endParaRPr lang="zh-CN" altLang="en-US"/>
           </a:p>
@@ -1603,7 +1768,7 @@
           <a:p>
             <a:fld id="{C8BC19B1-CC01-44C6-B518-3FF6E7FE4FAA}" type="datetimeFigureOut">
               <a:rPr lang="zh-CN" altLang="en-US" smtClean="0"/>
-              <a:t>2020-11-30</a:t>
+              <a:t>2021-08-22</a:t>
             </a:fld>
             <a:endParaRPr lang="zh-CN" altLang="en-US"/>
           </a:p>
@@ -2015,7 +2180,7 @@
           <a:p>
             <a:fld id="{C8BC19B1-CC01-44C6-B518-3FF6E7FE4FAA}" type="datetimeFigureOut">
               <a:rPr lang="zh-CN" altLang="en-US" smtClean="0"/>
-              <a:t>2020-11-30</a:t>
+              <a:t>2021-08-22</a:t>
             </a:fld>
             <a:endParaRPr lang="zh-CN" altLang="en-US"/>
           </a:p>
@@ -2156,7 +2321,7 @@
           <a:p>
             <a:fld id="{C8BC19B1-CC01-44C6-B518-3FF6E7FE4FAA}" type="datetimeFigureOut">
               <a:rPr lang="zh-CN" altLang="en-US" smtClean="0"/>
-              <a:t>2020-11-30</a:t>
+              <a:t>2021-08-22</a:t>
             </a:fld>
             <a:endParaRPr lang="zh-CN" altLang="en-US"/>
           </a:p>
@@ -2269,7 +2434,7 @@
           <a:p>
             <a:fld id="{C8BC19B1-CC01-44C6-B518-3FF6E7FE4FAA}" type="datetimeFigureOut">
               <a:rPr lang="zh-CN" altLang="en-US" smtClean="0"/>
-              <a:t>2020-11-30</a:t>
+              <a:t>2021-08-22</a:t>
             </a:fld>
             <a:endParaRPr lang="zh-CN" altLang="en-US"/>
           </a:p>
@@ -2580,7 +2745,7 @@
           <a:p>
             <a:fld id="{C8BC19B1-CC01-44C6-B518-3FF6E7FE4FAA}" type="datetimeFigureOut">
               <a:rPr lang="zh-CN" altLang="en-US" smtClean="0"/>
-              <a:t>2020-11-30</a:t>
+              <a:t>2021-08-22</a:t>
             </a:fld>
             <a:endParaRPr lang="zh-CN" altLang="en-US"/>
           </a:p>
@@ -2868,7 +3033,7 @@
           <a:p>
             <a:fld id="{C8BC19B1-CC01-44C6-B518-3FF6E7FE4FAA}" type="datetimeFigureOut">
               <a:rPr lang="zh-CN" altLang="en-US" smtClean="0"/>
-              <a:t>2020-11-30</a:t>
+              <a:t>2021-08-22</a:t>
             </a:fld>
             <a:endParaRPr lang="zh-CN" altLang="en-US"/>
           </a:p>
@@ -3109,7 +3274,7 @@
           <a:p>
             <a:fld id="{C8BC19B1-CC01-44C6-B518-3FF6E7FE4FAA}" type="datetimeFigureOut">
               <a:rPr lang="zh-CN" altLang="en-US" smtClean="0"/>
-              <a:t>2020-11-30</a:t>
+              <a:t>2021-08-22</a:t>
             </a:fld>
             <a:endParaRPr lang="zh-CN" altLang="en-US"/>
           </a:p>
@@ -6431,6 +6596,1103 @@
 </p:sld>
 </file>
 
+<file path=ppt/slides/slide3.xml><?xml version="1.0" encoding="utf-8"?>
+<p:sld xmlns:a="http://schemas.openxmlformats.org/drawingml/2006/main" xmlns:r="http://schemas.openxmlformats.org/officeDocument/2006/relationships" xmlns:p="http://schemas.openxmlformats.org/presentationml/2006/main">
+  <p:cSld>
+    <p:spTree>
+      <p:nvGrpSpPr>
+        <p:cNvPr id="1" name=""/>
+        <p:cNvGrpSpPr/>
+        <p:nvPr/>
+      </p:nvGrpSpPr>
+      <p:grpSpPr>
+        <a:xfrm>
+          <a:off x="0" y="0"/>
+          <a:ext cx="0" cy="0"/>
+          <a:chOff x="0" y="0"/>
+          <a:chExt cx="0" cy="0"/>
+        </a:xfrm>
+      </p:grpSpPr>
+      <p:pic>
+        <p:nvPicPr>
+          <p:cNvPr id="25" name="图片 24">
+            <a:extLst>
+              <a:ext uri="{FF2B5EF4-FFF2-40B4-BE49-F238E27FC236}">
+                <a16:creationId xmlns:a16="http://schemas.microsoft.com/office/drawing/2014/main" id="{07A8D77F-6312-4946-9D97-B805D1CAAEAB}"/>
+              </a:ext>
+            </a:extLst>
+          </p:cNvPr>
+          <p:cNvPicPr>
+            <a:picLocks noChangeAspect="1"/>
+          </p:cNvPicPr>
+          <p:nvPr/>
+        </p:nvPicPr>
+        <p:blipFill>
+          <a:blip r:embed="rId2"/>
+          <a:stretch>
+            <a:fillRect/>
+          </a:stretch>
+        </p:blipFill>
+        <p:spPr>
+          <a:xfrm>
+            <a:off x="1182609" y="534628"/>
+            <a:ext cx="5506022" cy="5402135"/>
+          </a:xfrm>
+          <a:prstGeom prst="rect">
+            <a:avLst/>
+          </a:prstGeom>
+        </p:spPr>
+      </p:pic>
+      <p:cxnSp>
+        <p:nvCxnSpPr>
+          <p:cNvPr id="8" name="直接箭头连接符 7">
+            <a:extLst>
+              <a:ext uri="{FF2B5EF4-FFF2-40B4-BE49-F238E27FC236}">
+                <a16:creationId xmlns:a16="http://schemas.microsoft.com/office/drawing/2014/main" id="{8C9F7433-D5EB-4EDD-BA2C-34633A487206}"/>
+              </a:ext>
+            </a:extLst>
+          </p:cNvPr>
+          <p:cNvCxnSpPr>
+            <a:cxnSpLocks/>
+          </p:cNvCxnSpPr>
+          <p:nvPr/>
+        </p:nvCxnSpPr>
+        <p:spPr>
+          <a:xfrm>
+            <a:off x="256153" y="1244324"/>
+            <a:ext cx="7027297" cy="0"/>
+          </a:xfrm>
+          <a:prstGeom prst="straightConnector1">
+            <a:avLst/>
+          </a:prstGeom>
+          <a:ln w="57150">
+            <a:solidFill>
+              <a:srgbClr val="FF0000"/>
+            </a:solidFill>
+            <a:tailEnd type="triangle"/>
+          </a:ln>
+        </p:spPr>
+        <p:style>
+          <a:lnRef idx="1">
+            <a:schemeClr val="accent1"/>
+          </a:lnRef>
+          <a:fillRef idx="0">
+            <a:schemeClr val="accent1"/>
+          </a:fillRef>
+          <a:effectRef idx="0">
+            <a:schemeClr val="accent1"/>
+          </a:effectRef>
+          <a:fontRef idx="minor">
+            <a:schemeClr val="tx1"/>
+          </a:fontRef>
+        </p:style>
+      </p:cxnSp>
+      <p:cxnSp>
+        <p:nvCxnSpPr>
+          <p:cNvPr id="18" name="直接箭头连接符 17">
+            <a:extLst>
+              <a:ext uri="{FF2B5EF4-FFF2-40B4-BE49-F238E27FC236}">
+                <a16:creationId xmlns:a16="http://schemas.microsoft.com/office/drawing/2014/main" id="{28C3C07A-B4DF-4AC8-9EBA-1688EA317900}"/>
+              </a:ext>
+            </a:extLst>
+          </p:cNvPr>
+          <p:cNvCxnSpPr>
+            <a:cxnSpLocks/>
+          </p:cNvCxnSpPr>
+          <p:nvPr/>
+        </p:nvCxnSpPr>
+        <p:spPr>
+          <a:xfrm>
+            <a:off x="1900803" y="-133604"/>
+            <a:ext cx="0" cy="6568744"/>
+          </a:xfrm>
+          <a:prstGeom prst="straightConnector1">
+            <a:avLst/>
+          </a:prstGeom>
+          <a:ln w="57150">
+            <a:solidFill>
+              <a:srgbClr val="92D050"/>
+            </a:solidFill>
+            <a:tailEnd type="triangle"/>
+          </a:ln>
+        </p:spPr>
+        <p:style>
+          <a:lnRef idx="1">
+            <a:schemeClr val="accent1"/>
+          </a:lnRef>
+          <a:fillRef idx="0">
+            <a:schemeClr val="accent1"/>
+          </a:fillRef>
+          <a:effectRef idx="0">
+            <a:schemeClr val="accent1"/>
+          </a:effectRef>
+          <a:fontRef idx="minor">
+            <a:schemeClr val="tx1"/>
+          </a:fontRef>
+        </p:style>
+      </p:cxnSp>
+      <p:sp>
+        <p:nvSpPr>
+          <p:cNvPr id="22" name="文本框 21">
+            <a:extLst>
+              <a:ext uri="{FF2B5EF4-FFF2-40B4-BE49-F238E27FC236}">
+                <a16:creationId xmlns:a16="http://schemas.microsoft.com/office/drawing/2014/main" id="{70490AE0-7CDE-4824-AF4B-F3F9D0B096F3}"/>
+              </a:ext>
+            </a:extLst>
+          </p:cNvPr>
+          <p:cNvSpPr txBox="1"/>
+          <p:nvPr/>
+        </p:nvSpPr>
+        <p:spPr>
+          <a:xfrm>
+            <a:off x="286800" y="992153"/>
+            <a:ext cx="8928652" cy="461665"/>
+          </a:xfrm>
+          <a:prstGeom prst="rect">
+            <a:avLst/>
+          </a:prstGeom>
+          <a:noFill/>
+        </p:spPr>
+        <p:txBody>
+          <a:bodyPr wrap="square" rtlCol="0">
+            <a:spAutoFit/>
+          </a:bodyPr>
+          <a:lstStyle/>
+          <a:p>
+            <a:r>
+              <a:rPr lang="en-US" altLang="zh-CN" sz="2400" b="1" dirty="0">
+                <a:solidFill>
+                  <a:srgbClr val="002060"/>
+                </a:solidFill>
+              </a:rPr>
+              <a:t>Lon-         0              1              2              3               4… Lon+</a:t>
+            </a:r>
+            <a:endParaRPr lang="zh-CN" altLang="en-US" sz="2400" b="1" dirty="0">
+              <a:solidFill>
+                <a:srgbClr val="002060"/>
+              </a:solidFill>
+            </a:endParaRPr>
+          </a:p>
+        </p:txBody>
+      </p:sp>
+      <p:sp>
+        <p:nvSpPr>
+          <p:cNvPr id="24" name="文本框 23">
+            <a:extLst>
+              <a:ext uri="{FF2B5EF4-FFF2-40B4-BE49-F238E27FC236}">
+                <a16:creationId xmlns:a16="http://schemas.microsoft.com/office/drawing/2014/main" id="{761C6EB7-603B-400A-82CB-0E36A3F2CA41}"/>
+              </a:ext>
+            </a:extLst>
+          </p:cNvPr>
+          <p:cNvSpPr txBox="1"/>
+          <p:nvPr/>
+        </p:nvSpPr>
+        <p:spPr>
+          <a:xfrm>
+            <a:off x="1282004" y="-20806"/>
+            <a:ext cx="768913" cy="6878806"/>
+          </a:xfrm>
+          <a:prstGeom prst="rect">
+            <a:avLst/>
+          </a:prstGeom>
+          <a:noFill/>
+        </p:spPr>
+        <p:txBody>
+          <a:bodyPr wrap="square" rtlCol="0">
+            <a:spAutoFit/>
+          </a:bodyPr>
+          <a:lstStyle/>
+          <a:p>
+            <a:pPr algn="r"/>
+            <a:r>
+              <a:rPr lang="en-US" altLang="zh-CN" sz="2300" b="1" dirty="0">
+                <a:solidFill>
+                  <a:srgbClr val="002060"/>
+                </a:solidFill>
+              </a:rPr>
+              <a:t>Lat-</a:t>
+            </a:r>
+          </a:p>
+          <a:p>
+            <a:pPr algn="r"/>
+            <a:endParaRPr lang="en-US" altLang="zh-CN" sz="2200" b="1" dirty="0">
+              <a:solidFill>
+                <a:srgbClr val="002060"/>
+              </a:solidFill>
+            </a:endParaRPr>
+          </a:p>
+          <a:p>
+            <a:pPr algn="r"/>
+            <a:endParaRPr lang="en-US" altLang="zh-CN" sz="2200" b="1" dirty="0">
+              <a:solidFill>
+                <a:srgbClr val="002060"/>
+              </a:solidFill>
+            </a:endParaRPr>
+          </a:p>
+          <a:p>
+            <a:pPr algn="r"/>
+            <a:r>
+              <a:rPr lang="en-US" altLang="zh-CN" sz="2200" b="1" dirty="0">
+                <a:solidFill>
+                  <a:srgbClr val="002060"/>
+                </a:solidFill>
+              </a:rPr>
+              <a:t>0</a:t>
+            </a:r>
+          </a:p>
+          <a:p>
+            <a:pPr algn="r"/>
+            <a:endParaRPr lang="en-US" altLang="zh-CN" sz="2200" b="1" dirty="0">
+              <a:solidFill>
+                <a:srgbClr val="002060"/>
+              </a:solidFill>
+            </a:endParaRPr>
+          </a:p>
+          <a:p>
+            <a:pPr algn="r"/>
+            <a:endParaRPr lang="en-US" altLang="zh-CN" sz="2200" b="1" dirty="0">
+              <a:solidFill>
+                <a:srgbClr val="002060"/>
+              </a:solidFill>
+            </a:endParaRPr>
+          </a:p>
+          <a:p>
+            <a:pPr algn="r"/>
+            <a:endParaRPr lang="en-US" altLang="zh-CN" sz="2200" b="1" dirty="0">
+              <a:solidFill>
+                <a:srgbClr val="002060"/>
+              </a:solidFill>
+            </a:endParaRPr>
+          </a:p>
+          <a:p>
+            <a:pPr algn="r"/>
+            <a:r>
+              <a:rPr lang="en-US" altLang="zh-CN" sz="2200" b="1" dirty="0">
+                <a:solidFill>
+                  <a:srgbClr val="002060"/>
+                </a:solidFill>
+              </a:rPr>
+              <a:t>1</a:t>
+            </a:r>
+          </a:p>
+          <a:p>
+            <a:pPr algn="r"/>
+            <a:endParaRPr lang="en-US" altLang="zh-CN" sz="2200" b="1" dirty="0">
+              <a:solidFill>
+                <a:srgbClr val="002060"/>
+              </a:solidFill>
+            </a:endParaRPr>
+          </a:p>
+          <a:p>
+            <a:pPr algn="r"/>
+            <a:endParaRPr lang="en-US" altLang="zh-CN" sz="2200" b="1" dirty="0">
+              <a:solidFill>
+                <a:srgbClr val="002060"/>
+              </a:solidFill>
+            </a:endParaRPr>
+          </a:p>
+          <a:p>
+            <a:pPr algn="r"/>
+            <a:endParaRPr lang="en-US" altLang="zh-CN" sz="2200" b="1" dirty="0">
+              <a:solidFill>
+                <a:srgbClr val="002060"/>
+              </a:solidFill>
+            </a:endParaRPr>
+          </a:p>
+          <a:p>
+            <a:pPr algn="r"/>
+            <a:r>
+              <a:rPr lang="en-US" altLang="zh-CN" sz="2200" b="1" dirty="0">
+                <a:solidFill>
+                  <a:srgbClr val="002060"/>
+                </a:solidFill>
+              </a:rPr>
+              <a:t>2</a:t>
+            </a:r>
+          </a:p>
+          <a:p>
+            <a:pPr algn="r"/>
+            <a:endParaRPr lang="en-US" altLang="zh-CN" sz="2200" b="1" dirty="0">
+              <a:solidFill>
+                <a:srgbClr val="002060"/>
+              </a:solidFill>
+            </a:endParaRPr>
+          </a:p>
+          <a:p>
+            <a:pPr algn="r"/>
+            <a:endParaRPr lang="en-US" altLang="zh-CN" sz="2200" b="1" dirty="0">
+              <a:solidFill>
+                <a:srgbClr val="002060"/>
+              </a:solidFill>
+            </a:endParaRPr>
+          </a:p>
+          <a:p>
+            <a:pPr algn="r"/>
+            <a:endParaRPr lang="en-US" altLang="zh-CN" sz="2200" b="1" dirty="0">
+              <a:solidFill>
+                <a:srgbClr val="002060"/>
+              </a:solidFill>
+            </a:endParaRPr>
+          </a:p>
+          <a:p>
+            <a:pPr algn="r"/>
+            <a:r>
+              <a:rPr lang="en-US" altLang="zh-CN" sz="2200" b="1" dirty="0">
+                <a:solidFill>
+                  <a:srgbClr val="002060"/>
+                </a:solidFill>
+              </a:rPr>
+              <a:t>3</a:t>
+            </a:r>
+          </a:p>
+          <a:p>
+            <a:pPr algn="r"/>
+            <a:endParaRPr lang="en-US" altLang="zh-CN" sz="2200" b="1" dirty="0">
+              <a:solidFill>
+                <a:srgbClr val="002060"/>
+              </a:solidFill>
+            </a:endParaRPr>
+          </a:p>
+          <a:p>
+            <a:pPr algn="r"/>
+            <a:endParaRPr lang="en-US" altLang="zh-CN" sz="2200" b="1" dirty="0">
+              <a:solidFill>
+                <a:srgbClr val="002060"/>
+              </a:solidFill>
+            </a:endParaRPr>
+          </a:p>
+          <a:p>
+            <a:pPr algn="r"/>
+            <a:r>
+              <a:rPr lang="en-US" altLang="zh-CN" sz="2200" b="1" dirty="0">
+                <a:solidFill>
+                  <a:srgbClr val="002060"/>
+                </a:solidFill>
+              </a:rPr>
+              <a:t>4</a:t>
+            </a:r>
+            <a:r>
+              <a:rPr lang="en-US" altLang="zh-CN" sz="1050" b="1" dirty="0">
+                <a:solidFill>
+                  <a:srgbClr val="002060"/>
+                </a:solidFill>
+              </a:rPr>
+              <a:t>……</a:t>
+            </a:r>
+          </a:p>
+          <a:p>
+            <a:pPr algn="r"/>
+            <a:r>
+              <a:rPr lang="en-US" altLang="zh-CN" sz="2200" b="1" dirty="0">
+                <a:solidFill>
+                  <a:srgbClr val="002060"/>
+                </a:solidFill>
+              </a:rPr>
+              <a:t>Lat+</a:t>
+            </a:r>
+          </a:p>
+        </p:txBody>
+      </p:sp>
+      <p:sp>
+        <p:nvSpPr>
+          <p:cNvPr id="2" name="文本框 1">
+            <a:extLst>
+              <a:ext uri="{FF2B5EF4-FFF2-40B4-BE49-F238E27FC236}">
+                <a16:creationId xmlns:a16="http://schemas.microsoft.com/office/drawing/2014/main" id="{D883025B-9371-4B64-9765-92E491A39D13}"/>
+              </a:ext>
+            </a:extLst>
+          </p:cNvPr>
+          <p:cNvSpPr txBox="1"/>
+          <p:nvPr/>
+        </p:nvSpPr>
+        <p:spPr>
+          <a:xfrm>
+            <a:off x="9659454" y="1165556"/>
+            <a:ext cx="3925957" cy="923330"/>
+          </a:xfrm>
+          <a:prstGeom prst="rect">
+            <a:avLst/>
+          </a:prstGeom>
+          <a:noFill/>
+        </p:spPr>
+        <p:txBody>
+          <a:bodyPr wrap="square" rtlCol="0">
+            <a:spAutoFit/>
+          </a:bodyPr>
+          <a:lstStyle/>
+          <a:p>
+            <a:r>
+              <a:rPr lang="en-US" altLang="zh-CN" dirty="0"/>
+              <a:t>Overviewer coordinate reference system </a:t>
+            </a:r>
+          </a:p>
+          <a:p>
+            <a:r>
+              <a:rPr lang="en-US" altLang="zh-CN" dirty="0"/>
+              <a:t>Leaflet </a:t>
+            </a:r>
+            <a:r>
+              <a:rPr lang="en-US" altLang="zh-CN" dirty="0" err="1"/>
+              <a:t>CRS.Simple</a:t>
+            </a:r>
+            <a:endParaRPr lang="zh-CN" altLang="en-US" dirty="0"/>
+          </a:p>
+        </p:txBody>
+      </p:sp>
+      <p:graphicFrame>
+        <p:nvGraphicFramePr>
+          <p:cNvPr id="9" name="表格 8">
+            <a:extLst>
+              <a:ext uri="{FF2B5EF4-FFF2-40B4-BE49-F238E27FC236}">
+                <a16:creationId xmlns:a16="http://schemas.microsoft.com/office/drawing/2014/main" id="{5956A54D-DF5A-4556-B954-27232FA7A398}"/>
+              </a:ext>
+            </a:extLst>
+          </p:cNvPr>
+          <p:cNvGraphicFramePr>
+            <a:graphicFrameLocks noGrp="1"/>
+          </p:cNvGraphicFramePr>
+          <p:nvPr>
+            <p:extLst>
+              <p:ext uri="{D42A27DB-BD31-4B8C-83A1-F6EECF244321}">
+                <p14:modId xmlns:p14="http://schemas.microsoft.com/office/powerpoint/2010/main" val="1387963659"/>
+              </p:ext>
+            </p:extLst>
+          </p:nvPr>
+        </p:nvGraphicFramePr>
+        <p:xfrm>
+          <a:off x="6865613" y="3907803"/>
+          <a:ext cx="1129728" cy="1051294"/>
+        </p:xfrm>
+        <a:graphic>
+          <a:graphicData uri="http://schemas.openxmlformats.org/drawingml/2006/table">
+            <a:tbl>
+              <a:tblPr firstRow="1" bandRow="1">
+                <a:tableStyleId>{5C22544A-7EE6-4342-B048-85BDC9FD1C3A}</a:tableStyleId>
+              </a:tblPr>
+              <a:tblGrid>
+                <a:gridCol w="564864">
+                  <a:extLst>
+                    <a:ext uri="{9D8B030D-6E8A-4147-A177-3AD203B41FA5}">
+                      <a16:colId xmlns:a16="http://schemas.microsoft.com/office/drawing/2014/main" val="1770315781"/>
+                    </a:ext>
+                  </a:extLst>
+                </a:gridCol>
+                <a:gridCol w="564864">
+                  <a:extLst>
+                    <a:ext uri="{9D8B030D-6E8A-4147-A177-3AD203B41FA5}">
+                      <a16:colId xmlns:a16="http://schemas.microsoft.com/office/drawing/2014/main" val="1736081006"/>
+                    </a:ext>
+                  </a:extLst>
+                </a:gridCol>
+              </a:tblGrid>
+              <a:tr h="525647">
+                <a:tc>
+                  <a:txBody>
+                    <a:bodyPr/>
+                    <a:lstStyle/>
+                    <a:p>
+                      <a:endParaRPr lang="zh-CN" altLang="en-US" sz="1200" dirty="0"/>
+                    </a:p>
+                  </a:txBody>
+                  <a:tcPr marL="59390" marR="59390" marT="29695" marB="29695">
+                    <a:lnL w="12700" cap="flat" cmpd="sng" algn="ctr">
+                      <a:solidFill>
+                        <a:schemeClr val="tx1"/>
+                      </a:solidFill>
+                      <a:prstDash val="solid"/>
+                      <a:round/>
+                      <a:headEnd type="none" w="med" len="med"/>
+                      <a:tailEnd type="none" w="med" len="med"/>
+                    </a:lnL>
+                    <a:lnT w="12700" cap="flat" cmpd="sng" algn="ctr">
+                      <a:solidFill>
+                        <a:schemeClr val="tx1"/>
+                      </a:solidFill>
+                      <a:prstDash val="solid"/>
+                      <a:round/>
+                      <a:headEnd type="none" w="med" len="med"/>
+                      <a:tailEnd type="none" w="med" len="med"/>
+                    </a:lnT>
+                    <a:solidFill>
+                      <a:schemeClr val="accent2">
+                        <a:lumMod val="40000"/>
+                        <a:lumOff val="60000"/>
+                      </a:schemeClr>
+                    </a:solidFill>
+                  </a:tcPr>
+                </a:tc>
+                <a:tc>
+                  <a:txBody>
+                    <a:bodyPr/>
+                    <a:lstStyle/>
+                    <a:p>
+                      <a:endParaRPr lang="zh-CN" altLang="en-US" sz="1200" dirty="0"/>
+                    </a:p>
+                  </a:txBody>
+                  <a:tcPr marL="59390" marR="59390" marT="29695" marB="29695">
+                    <a:lnR w="12700" cap="flat" cmpd="sng" algn="ctr">
+                      <a:solidFill>
+                        <a:schemeClr val="tx1"/>
+                      </a:solidFill>
+                      <a:prstDash val="solid"/>
+                      <a:round/>
+                      <a:headEnd type="none" w="med" len="med"/>
+                      <a:tailEnd type="none" w="med" len="med"/>
+                    </a:lnR>
+                    <a:lnT w="12700" cap="flat" cmpd="sng" algn="ctr">
+                      <a:solidFill>
+                        <a:schemeClr val="tx1"/>
+                      </a:solidFill>
+                      <a:prstDash val="solid"/>
+                      <a:round/>
+                      <a:headEnd type="none" w="med" len="med"/>
+                      <a:tailEnd type="none" w="med" len="med"/>
+                    </a:lnT>
+                    <a:solidFill>
+                      <a:schemeClr val="accent2">
+                        <a:lumMod val="40000"/>
+                        <a:lumOff val="60000"/>
+                      </a:schemeClr>
+                    </a:solidFill>
+                  </a:tcPr>
+                </a:tc>
+                <a:extLst>
+                  <a:ext uri="{0D108BD9-81ED-4DB2-BD59-A6C34878D82A}">
+                    <a16:rowId xmlns:a16="http://schemas.microsoft.com/office/drawing/2014/main" val="3615432839"/>
+                  </a:ext>
+                </a:extLst>
+              </a:tr>
+              <a:tr h="525647">
+                <a:tc>
+                  <a:txBody>
+                    <a:bodyPr/>
+                    <a:lstStyle/>
+                    <a:p>
+                      <a:endParaRPr lang="zh-CN" altLang="en-US" sz="1200" dirty="0"/>
+                    </a:p>
+                  </a:txBody>
+                  <a:tcPr marL="59390" marR="59390" marT="29695" marB="29695">
+                    <a:lnL w="12700" cap="flat" cmpd="sng" algn="ctr">
+                      <a:solidFill>
+                        <a:schemeClr val="tx1"/>
+                      </a:solidFill>
+                      <a:prstDash val="solid"/>
+                      <a:round/>
+                      <a:headEnd type="none" w="med" len="med"/>
+                      <a:tailEnd type="none" w="med" len="med"/>
+                    </a:lnL>
+                    <a:lnB w="12700" cap="flat" cmpd="sng" algn="ctr">
+                      <a:solidFill>
+                        <a:schemeClr val="tx1"/>
+                      </a:solidFill>
+                      <a:prstDash val="solid"/>
+                      <a:round/>
+                      <a:headEnd type="none" w="med" len="med"/>
+                      <a:tailEnd type="none" w="med" len="med"/>
+                    </a:lnB>
+                    <a:solidFill>
+                      <a:schemeClr val="accent2">
+                        <a:lumMod val="40000"/>
+                        <a:lumOff val="60000"/>
+                      </a:schemeClr>
+                    </a:solidFill>
+                  </a:tcPr>
+                </a:tc>
+                <a:tc>
+                  <a:txBody>
+                    <a:bodyPr/>
+                    <a:lstStyle/>
+                    <a:p>
+                      <a:endParaRPr lang="zh-CN" altLang="en-US" sz="1200" dirty="0"/>
+                    </a:p>
+                  </a:txBody>
+                  <a:tcPr marL="59390" marR="59390" marT="29695" marB="29695">
+                    <a:lnR w="12700" cap="flat" cmpd="sng" algn="ctr">
+                      <a:solidFill>
+                        <a:schemeClr val="tx1"/>
+                      </a:solidFill>
+                      <a:prstDash val="solid"/>
+                      <a:round/>
+                      <a:headEnd type="none" w="med" len="med"/>
+                      <a:tailEnd type="none" w="med" len="med"/>
+                    </a:lnR>
+                    <a:lnB w="12700" cap="flat" cmpd="sng" algn="ctr">
+                      <a:solidFill>
+                        <a:schemeClr val="tx1"/>
+                      </a:solidFill>
+                      <a:prstDash val="solid"/>
+                      <a:round/>
+                      <a:headEnd type="none" w="med" len="med"/>
+                      <a:tailEnd type="none" w="med" len="med"/>
+                    </a:lnB>
+                    <a:solidFill>
+                      <a:schemeClr val="accent2">
+                        <a:lumMod val="40000"/>
+                        <a:lumOff val="60000"/>
+                      </a:schemeClr>
+                    </a:solidFill>
+                  </a:tcPr>
+                </a:tc>
+                <a:extLst>
+                  <a:ext uri="{0D108BD9-81ED-4DB2-BD59-A6C34878D82A}">
+                    <a16:rowId xmlns:a16="http://schemas.microsoft.com/office/drawing/2014/main" val="1042322773"/>
+                  </a:ext>
+                </a:extLst>
+              </a:tr>
+            </a:tbl>
+          </a:graphicData>
+        </a:graphic>
+      </p:graphicFrame>
+      <p:sp>
+        <p:nvSpPr>
+          <p:cNvPr id="10" name="文本框 9">
+            <a:extLst>
+              <a:ext uri="{FF2B5EF4-FFF2-40B4-BE49-F238E27FC236}">
+                <a16:creationId xmlns:a16="http://schemas.microsoft.com/office/drawing/2014/main" id="{34C9DBF4-CD33-443C-8AB1-45C2B5571234}"/>
+              </a:ext>
+            </a:extLst>
+          </p:cNvPr>
+          <p:cNvSpPr txBox="1"/>
+          <p:nvPr/>
+        </p:nvSpPr>
+        <p:spPr>
+          <a:xfrm>
+            <a:off x="6963041" y="5083036"/>
+            <a:ext cx="934871" cy="1661993"/>
+          </a:xfrm>
+          <a:prstGeom prst="rect">
+            <a:avLst/>
+          </a:prstGeom>
+          <a:noFill/>
+        </p:spPr>
+        <p:txBody>
+          <a:bodyPr wrap="square" rtlCol="0">
+            <a:spAutoFit/>
+          </a:bodyPr>
+          <a:lstStyle/>
+          <a:p>
+            <a:pPr algn="ctr"/>
+            <a:r>
+              <a:rPr lang="zh-CN" altLang="en-US" sz="5400" b="1" dirty="0">
+                <a:solidFill>
+                  <a:srgbClr val="002060"/>
+                </a:solidFill>
+              </a:rPr>
+              <a:t>↑</a:t>
+            </a:r>
+            <a:endParaRPr lang="en-US" altLang="zh-CN" sz="5400" b="1" dirty="0">
+              <a:solidFill>
+                <a:srgbClr val="002060"/>
+              </a:solidFill>
+            </a:endParaRPr>
+          </a:p>
+          <a:p>
+            <a:pPr algn="ctr"/>
+            <a:r>
+              <a:rPr lang="en-US" altLang="zh-CN" sz="2400" b="1" dirty="0">
+                <a:solidFill>
+                  <a:srgbClr val="002060"/>
+                </a:solidFill>
+              </a:rPr>
+              <a:t>=</a:t>
+            </a:r>
+          </a:p>
+          <a:p>
+            <a:pPr algn="ctr"/>
+            <a:r>
+              <a:rPr lang="en-US" altLang="zh-CN" sz="2400" b="1" dirty="0">
+                <a:solidFill>
+                  <a:srgbClr val="002060"/>
+                </a:solidFill>
+              </a:rPr>
+              <a:t>1 Tile</a:t>
+            </a:r>
+            <a:endParaRPr lang="zh-CN" altLang="en-US" sz="2400" b="1" dirty="0">
+              <a:solidFill>
+                <a:srgbClr val="002060"/>
+              </a:solidFill>
+            </a:endParaRPr>
+          </a:p>
+        </p:txBody>
+      </p:sp>
+      <p:cxnSp>
+        <p:nvCxnSpPr>
+          <p:cNvPr id="23" name="直接箭头连接符 22">
+            <a:extLst>
+              <a:ext uri="{FF2B5EF4-FFF2-40B4-BE49-F238E27FC236}">
+                <a16:creationId xmlns:a16="http://schemas.microsoft.com/office/drawing/2014/main" id="{4F4C5BA0-6D85-4667-A5DF-86287FEEB2D6}"/>
+              </a:ext>
+            </a:extLst>
+          </p:cNvPr>
+          <p:cNvCxnSpPr>
+            <a:cxnSpLocks/>
+          </p:cNvCxnSpPr>
+          <p:nvPr/>
+        </p:nvCxnSpPr>
+        <p:spPr>
+          <a:xfrm>
+            <a:off x="-67543" y="3225800"/>
+            <a:ext cx="8033635" cy="0"/>
+          </a:xfrm>
+          <a:prstGeom prst="straightConnector1">
+            <a:avLst/>
+          </a:prstGeom>
+          <a:ln w="57150">
+            <a:solidFill>
+              <a:srgbClr val="FF0000"/>
+            </a:solidFill>
+            <a:tailEnd type="triangle"/>
+          </a:ln>
+        </p:spPr>
+        <p:style>
+          <a:lnRef idx="1">
+            <a:schemeClr val="accent1"/>
+          </a:lnRef>
+          <a:fillRef idx="0">
+            <a:schemeClr val="accent1"/>
+          </a:fillRef>
+          <a:effectRef idx="0">
+            <a:schemeClr val="accent1"/>
+          </a:effectRef>
+          <a:fontRef idx="minor">
+            <a:schemeClr val="tx1"/>
+          </a:fontRef>
+        </p:style>
+      </p:cxnSp>
+      <p:cxnSp>
+        <p:nvCxnSpPr>
+          <p:cNvPr id="26" name="直接箭头连接符 25">
+            <a:extLst>
+              <a:ext uri="{FF2B5EF4-FFF2-40B4-BE49-F238E27FC236}">
+                <a16:creationId xmlns:a16="http://schemas.microsoft.com/office/drawing/2014/main" id="{0A5A9637-66B5-4DB9-81F2-17DC41F8BE79}"/>
+              </a:ext>
+            </a:extLst>
+          </p:cNvPr>
+          <p:cNvCxnSpPr>
+            <a:cxnSpLocks/>
+          </p:cNvCxnSpPr>
+          <p:nvPr/>
+        </p:nvCxnSpPr>
+        <p:spPr>
+          <a:xfrm flipV="1">
+            <a:off x="3909270" y="-88900"/>
+            <a:ext cx="0" cy="6505162"/>
+          </a:xfrm>
+          <a:prstGeom prst="straightConnector1">
+            <a:avLst/>
+          </a:prstGeom>
+          <a:ln w="57150">
+            <a:solidFill>
+              <a:srgbClr val="92D050"/>
+            </a:solidFill>
+            <a:tailEnd type="triangle"/>
+          </a:ln>
+        </p:spPr>
+        <p:style>
+          <a:lnRef idx="1">
+            <a:schemeClr val="accent1"/>
+          </a:lnRef>
+          <a:fillRef idx="0">
+            <a:schemeClr val="accent1"/>
+          </a:fillRef>
+          <a:effectRef idx="0">
+            <a:schemeClr val="accent1"/>
+          </a:effectRef>
+          <a:fontRef idx="minor">
+            <a:schemeClr val="tx1"/>
+          </a:fontRef>
+        </p:style>
+      </p:cxnSp>
+      <p:sp>
+        <p:nvSpPr>
+          <p:cNvPr id="27" name="文本框 26">
+            <a:extLst>
+              <a:ext uri="{FF2B5EF4-FFF2-40B4-BE49-F238E27FC236}">
+                <a16:creationId xmlns:a16="http://schemas.microsoft.com/office/drawing/2014/main" id="{440F10CB-0959-4909-80CC-0DDF59C412BB}"/>
+              </a:ext>
+            </a:extLst>
+          </p:cNvPr>
+          <p:cNvSpPr txBox="1"/>
+          <p:nvPr/>
+        </p:nvSpPr>
+        <p:spPr>
+          <a:xfrm>
+            <a:off x="87398" y="2932848"/>
+            <a:ext cx="8296856" cy="461665"/>
+          </a:xfrm>
+          <a:prstGeom prst="rect">
+            <a:avLst/>
+          </a:prstGeom>
+          <a:noFill/>
+        </p:spPr>
+        <p:txBody>
+          <a:bodyPr wrap="square" rtlCol="0">
+            <a:spAutoFit/>
+          </a:bodyPr>
+          <a:lstStyle/>
+          <a:p>
+            <a:r>
+              <a:rPr lang="en-US" altLang="zh-CN" sz="2400" b="1" dirty="0">
+                <a:solidFill>
+                  <a:srgbClr val="002060"/>
+                </a:solidFill>
+              </a:rPr>
+              <a:t>A- … -4    -3    -2     -1      0      1      2      3      4……  A+</a:t>
+            </a:r>
+            <a:endParaRPr lang="zh-CN" altLang="en-US" sz="2400" b="1" dirty="0">
+              <a:solidFill>
+                <a:srgbClr val="002060"/>
+              </a:solidFill>
+            </a:endParaRPr>
+          </a:p>
+        </p:txBody>
+      </p:sp>
+      <p:sp>
+        <p:nvSpPr>
+          <p:cNvPr id="28" name="文本框 27">
+            <a:extLst>
+              <a:ext uri="{FF2B5EF4-FFF2-40B4-BE49-F238E27FC236}">
+                <a16:creationId xmlns:a16="http://schemas.microsoft.com/office/drawing/2014/main" id="{95A76AD0-A301-44F4-80AD-69F5D8DE2212}"/>
+              </a:ext>
+            </a:extLst>
+          </p:cNvPr>
+          <p:cNvSpPr txBox="1"/>
+          <p:nvPr/>
+        </p:nvSpPr>
+        <p:spPr>
+          <a:xfrm>
+            <a:off x="3465035" y="-321325"/>
+            <a:ext cx="610175" cy="7094250"/>
+          </a:xfrm>
+          <a:prstGeom prst="rect">
+            <a:avLst/>
+          </a:prstGeom>
+          <a:noFill/>
+        </p:spPr>
+        <p:txBody>
+          <a:bodyPr wrap="square" rtlCol="0">
+            <a:spAutoFit/>
+          </a:bodyPr>
+          <a:lstStyle/>
+          <a:p>
+            <a:pPr algn="r"/>
+            <a:r>
+              <a:rPr lang="en-US" altLang="zh-CN" sz="2300" b="1" dirty="0">
+                <a:solidFill>
+                  <a:srgbClr val="002060"/>
+                </a:solidFill>
+              </a:rPr>
+              <a:t>B+</a:t>
+            </a:r>
+          </a:p>
+          <a:p>
+            <a:pPr algn="r"/>
+            <a:r>
+              <a:rPr lang="en-US" altLang="zh-CN" sz="1100" b="1" dirty="0">
+                <a:solidFill>
+                  <a:srgbClr val="002060"/>
+                </a:solidFill>
+              </a:rPr>
+              <a:t>……</a:t>
+            </a:r>
+          </a:p>
+          <a:p>
+            <a:pPr algn="r"/>
+            <a:r>
+              <a:rPr lang="en-US" altLang="zh-CN" sz="2300" b="1" dirty="0">
+                <a:solidFill>
+                  <a:srgbClr val="002060"/>
+                </a:solidFill>
+              </a:rPr>
+              <a:t>4</a:t>
+            </a:r>
+          </a:p>
+          <a:p>
+            <a:pPr algn="r"/>
+            <a:endParaRPr lang="en-US" altLang="zh-CN" sz="2300" b="1" dirty="0">
+              <a:solidFill>
+                <a:srgbClr val="002060"/>
+              </a:solidFill>
+            </a:endParaRPr>
+          </a:p>
+          <a:p>
+            <a:pPr algn="r"/>
+            <a:r>
+              <a:rPr lang="en-US" altLang="zh-CN" sz="2300" b="1" dirty="0">
+                <a:solidFill>
+                  <a:srgbClr val="002060"/>
+                </a:solidFill>
+              </a:rPr>
+              <a:t>3</a:t>
+            </a:r>
+          </a:p>
+          <a:p>
+            <a:pPr algn="r"/>
+            <a:endParaRPr lang="en-US" altLang="zh-CN" sz="2300" b="1" dirty="0">
+              <a:solidFill>
+                <a:srgbClr val="002060"/>
+              </a:solidFill>
+            </a:endParaRPr>
+          </a:p>
+          <a:p>
+            <a:pPr algn="r"/>
+            <a:r>
+              <a:rPr lang="en-US" altLang="zh-CN" sz="2300" b="1" dirty="0">
+                <a:solidFill>
+                  <a:srgbClr val="002060"/>
+                </a:solidFill>
+              </a:rPr>
+              <a:t>2</a:t>
+            </a:r>
+          </a:p>
+          <a:p>
+            <a:pPr algn="r"/>
+            <a:endParaRPr lang="en-US" altLang="zh-CN" sz="2300" b="1" dirty="0">
+              <a:solidFill>
+                <a:srgbClr val="002060"/>
+              </a:solidFill>
+            </a:endParaRPr>
+          </a:p>
+          <a:p>
+            <a:pPr algn="r"/>
+            <a:r>
+              <a:rPr lang="en-US" altLang="zh-CN" sz="2300" b="1" dirty="0">
+                <a:solidFill>
+                  <a:srgbClr val="002060"/>
+                </a:solidFill>
+              </a:rPr>
+              <a:t>1</a:t>
+            </a:r>
+          </a:p>
+          <a:p>
+            <a:pPr algn="r"/>
+            <a:endParaRPr lang="en-US" altLang="zh-CN" sz="2300" b="1" dirty="0">
+              <a:solidFill>
+                <a:srgbClr val="002060"/>
+              </a:solidFill>
+            </a:endParaRPr>
+          </a:p>
+          <a:p>
+            <a:pPr algn="r"/>
+            <a:endParaRPr lang="en-US" altLang="zh-CN" sz="1600" b="1" dirty="0">
+              <a:solidFill>
+                <a:srgbClr val="002060"/>
+              </a:solidFill>
+            </a:endParaRPr>
+          </a:p>
+          <a:p>
+            <a:pPr algn="r"/>
+            <a:endParaRPr lang="en-US" altLang="zh-CN" sz="2300" b="1" dirty="0">
+              <a:solidFill>
+                <a:srgbClr val="002060"/>
+              </a:solidFill>
+            </a:endParaRPr>
+          </a:p>
+          <a:p>
+            <a:pPr algn="r"/>
+            <a:r>
+              <a:rPr lang="en-US" altLang="zh-CN" sz="2200" b="1" dirty="0">
+                <a:solidFill>
+                  <a:srgbClr val="002060"/>
+                </a:solidFill>
+              </a:rPr>
+              <a:t>-1</a:t>
+            </a:r>
+          </a:p>
+          <a:p>
+            <a:pPr algn="r"/>
+            <a:endParaRPr lang="en-US" altLang="zh-CN" sz="2200" b="1" dirty="0">
+              <a:solidFill>
+                <a:srgbClr val="002060"/>
+              </a:solidFill>
+            </a:endParaRPr>
+          </a:p>
+          <a:p>
+            <a:pPr algn="r"/>
+            <a:r>
+              <a:rPr lang="en-US" altLang="zh-CN" sz="2200" b="1" dirty="0">
+                <a:solidFill>
+                  <a:srgbClr val="002060"/>
+                </a:solidFill>
+              </a:rPr>
+              <a:t>-2</a:t>
+            </a:r>
+          </a:p>
+          <a:p>
+            <a:pPr algn="r"/>
+            <a:endParaRPr lang="en-US" altLang="zh-CN" sz="2200" b="1" dirty="0">
+              <a:solidFill>
+                <a:srgbClr val="002060"/>
+              </a:solidFill>
+            </a:endParaRPr>
+          </a:p>
+          <a:p>
+            <a:pPr algn="r"/>
+            <a:r>
+              <a:rPr lang="en-US" altLang="zh-CN" sz="2200" b="1" dirty="0">
+                <a:solidFill>
+                  <a:srgbClr val="002060"/>
+                </a:solidFill>
+              </a:rPr>
+              <a:t>-3</a:t>
+            </a:r>
+          </a:p>
+          <a:p>
+            <a:pPr algn="r"/>
+            <a:endParaRPr lang="en-US" altLang="zh-CN" sz="2200" b="1" dirty="0">
+              <a:solidFill>
+                <a:srgbClr val="002060"/>
+              </a:solidFill>
+            </a:endParaRPr>
+          </a:p>
+          <a:p>
+            <a:pPr algn="r"/>
+            <a:r>
+              <a:rPr lang="en-US" altLang="zh-CN" sz="2200" b="1" dirty="0">
+                <a:solidFill>
+                  <a:srgbClr val="002060"/>
+                </a:solidFill>
+              </a:rPr>
+              <a:t>-4</a:t>
+            </a:r>
+          </a:p>
+          <a:p>
+            <a:pPr algn="r"/>
+            <a:r>
+              <a:rPr lang="en-US" altLang="zh-CN" sz="1050" b="1" dirty="0">
+                <a:solidFill>
+                  <a:srgbClr val="002060"/>
+                </a:solidFill>
+              </a:rPr>
+              <a:t>……</a:t>
+            </a:r>
+          </a:p>
+          <a:p>
+            <a:pPr algn="r"/>
+            <a:r>
+              <a:rPr lang="en-US" altLang="zh-CN" sz="2200" b="1" dirty="0">
+                <a:solidFill>
+                  <a:srgbClr val="002060"/>
+                </a:solidFill>
+              </a:rPr>
+              <a:t>B-</a:t>
+            </a:r>
+          </a:p>
+        </p:txBody>
+      </p:sp>
+    </p:spTree>
+    <p:extLst>
+      <p:ext uri="{BB962C8B-B14F-4D97-AF65-F5344CB8AC3E}">
+        <p14:creationId xmlns:p14="http://schemas.microsoft.com/office/powerpoint/2010/main" val="1823947985"/>
+      </p:ext>
+    </p:extLst>
+  </p:cSld>
+  <p:clrMapOvr>
+    <a:masterClrMapping/>
+  </p:clrMapOvr>
+</p:sld>
+</file>
+
 <file path=ppt/theme/theme1.xml><?xml version="1.0" encoding="utf-8"?>
 <a:theme xmlns:a="http://schemas.openxmlformats.org/drawingml/2006/main" name="Office 主题​​">
   <a:themeElements>

</xml_diff>